<commit_message>
Edited footer of 5-slide for domain name
</commit_message>
<xml_diff>
--- a/5-slide-requirement_GIDEON.pptx
+++ b/5-slide-requirement_GIDEON.pptx
@@ -3040,8 +3040,19 @@
                 <a:latin typeface="Roboto Condensed Light" panose="02000000000000000000" pitchFamily="2" charset="0"/>
                 <a:ea typeface="Roboto Condensed Light" panose="02000000000000000000" pitchFamily="2" charset="0"/>
               </a:rPr>
-              <a:t>Team GIDEON</a:t>
-            </a:r>
+              <a:t>Team GIDEON – Visit us at </a:t>
+            </a:r>
+            <a:r>
+              <a:rPr lang="en-US" sz="2400" dirty="0" err="1">
+                <a:latin typeface="Roboto Condensed Light" panose="02000000000000000000" pitchFamily="2" charset="0"/>
+                <a:ea typeface="Roboto Condensed Light" panose="02000000000000000000" pitchFamily="2" charset="0"/>
+              </a:rPr>
+              <a:t>projectgideon.co</a:t>
+            </a:r>
+            <a:endParaRPr lang="en-US" sz="2400" dirty="0">
+              <a:latin typeface="Roboto Condensed Light" panose="02000000000000000000" pitchFamily="2" charset="0"/>
+              <a:ea typeface="Roboto Condensed Light" panose="02000000000000000000" pitchFamily="2" charset="0"/>
+            </a:endParaRPr>
           </a:p>
         </p:txBody>
       </p:sp>
@@ -4323,8 +4334,13 @@
           <a:p>
             <a:r>
               <a:rPr lang="en-US" sz="2400" dirty="0"/>
-              <a:t>Team GIDEON</a:t>
-            </a:r>
+              <a:t>Team GIDEON – Visit us at </a:t>
+            </a:r>
+            <a:r>
+              <a:rPr lang="en-US" sz="2400" dirty="0" err="1"/>
+              <a:t>projectgideon.co</a:t>
+            </a:r>
+            <a:endParaRPr lang="en-US" sz="2400" dirty="0"/>
           </a:p>
         </p:txBody>
       </p:sp>
@@ -5043,8 +5059,13 @@
           <a:p>
             <a:r>
               <a:rPr lang="en-US" sz="2400" dirty="0"/>
-              <a:t>Team GIDEON</a:t>
-            </a:r>
+              <a:t>Team GIDEON – Visit us at </a:t>
+            </a:r>
+            <a:r>
+              <a:rPr lang="en-US" sz="2400" dirty="0" err="1"/>
+              <a:t>projectgideon.co</a:t>
+            </a:r>
+            <a:endParaRPr lang="en-US" sz="2400" dirty="0"/>
           </a:p>
         </p:txBody>
       </p:sp>
@@ -5652,8 +5673,13 @@
           <a:p>
             <a:r>
               <a:rPr lang="en-US" sz="2400" dirty="0"/>
-              <a:t>Team GIDEON</a:t>
-            </a:r>
+              <a:t>Team GIDEON – Visit us at </a:t>
+            </a:r>
+            <a:r>
+              <a:rPr lang="en-US" sz="2400" dirty="0" err="1"/>
+              <a:t>projectgideon.co</a:t>
+            </a:r>
+            <a:endParaRPr lang="en-US" sz="2400" dirty="0"/>
           </a:p>
         </p:txBody>
       </p:sp>
@@ -6264,7 +6290,15 @@
           <a:p>
             <a:r>
               <a:rPr lang="en-US" sz="2400" dirty="0"/>
-              <a:t>Team GIDEON</a:t>
+              <a:t>Team GIDEON – Beat the odds  with data.  - https://</a:t>
+            </a:r>
+            <a:r>
+              <a:rPr lang="en-US" sz="2400" dirty="0" err="1"/>
+              <a:t>projectgideon.co</a:t>
+            </a:r>
+            <a:r>
+              <a:rPr lang="en-US" sz="2400" dirty="0"/>
+              <a:t>/</a:t>
             </a:r>
           </a:p>
         </p:txBody>
@@ -6693,7 +6727,7 @@
           <a:p>
             <a:r>
               <a:rPr lang="en-US" sz="1400" dirty="0"/>
-              <a:t>Apart from the acronym, the team name is inspired by the story of Gideon in the book of Judges in the Bible which beat the odds in warfare with 3 symbolic items: trumpet (noise of human activity), clay jar (the enclosure caused by Covid-19), and the torch (night light NASA data). </a:t>
+              <a:t>Apart from the acronym, the team name is inspired by the story of Gideon in the book of Judges in the Bible which beat the odds in warfare against Midianites with 3 symbolic items: trumpet (noise of human activity), clay jar (the isolation caused by Covid-19), and the torch (night light NASA data). </a:t>
             </a:r>
           </a:p>
         </p:txBody>

</xml_diff>